<commit_message>
Uploading image is working again
</commit_message>
<xml_diff>
--- a/presentation/presentation.pptx
+++ b/presentation/presentation.pptx
@@ -25,7 +25,7 @@
     <p:sldId id="266" r:id="rId13"/>
     <p:sldId id="269" r:id="rId14"/>
     <p:sldId id="270" r:id="rId15"/>
-    <p:sldId id="265" r:id="rId16"/>
+    <p:sldId id="271" r:id="rId16"/>
   </p:sldIdLst>
   <p:sldSz cx="9144000" cy="6858000" type="screen4x3"/>
   <p:notesSz cx="6858000" cy="9144000"/>
@@ -678,6 +678,91 @@
 </p:notesMaster>
 </file>
 
+<file path=ppt/notesSlides/notesSlide1.xml><?xml version="1.0" encoding="utf-8"?>
+<p:notes xmlns:a="http://schemas.openxmlformats.org/drawingml/2006/main" xmlns:r="http://schemas.openxmlformats.org/officeDocument/2006/relationships" xmlns:p="http://schemas.openxmlformats.org/presentationml/2006/main">
+  <p:cSld>
+    <p:spTree>
+      <p:nvGrpSpPr>
+        <p:cNvPr id="1" name=""/>
+        <p:cNvGrpSpPr/>
+        <p:nvPr/>
+      </p:nvGrpSpPr>
+      <p:grpSpPr>
+        <a:xfrm>
+          <a:off x="0" y="0"/>
+          <a:ext cx="0" cy="0"/>
+          <a:chOff x="0" y="0"/>
+          <a:chExt cx="0" cy="0"/>
+        </a:xfrm>
+      </p:grpSpPr>
+      <p:sp>
+        <p:nvSpPr>
+          <p:cNvPr id="2" name="Folienbildplatzhalter 1"/>
+          <p:cNvSpPr>
+            <a:spLocks noGrp="1" noRot="1" noChangeAspect="1"/>
+          </p:cNvSpPr>
+          <p:nvPr>
+            <p:ph type="sldImg"/>
+          </p:nvPr>
+        </p:nvSpPr>
+        <p:spPr/>
+      </p:sp>
+      <p:sp>
+        <p:nvSpPr>
+          <p:cNvPr id="3" name="Notizenplatzhalter 2"/>
+          <p:cNvSpPr>
+            <a:spLocks noGrp="1"/>
+          </p:cNvSpPr>
+          <p:nvPr>
+            <p:ph type="body" idx="1"/>
+          </p:nvPr>
+        </p:nvSpPr>
+        <p:spPr/>
+        <p:txBody>
+          <a:bodyPr/>
+          <a:lstStyle/>
+          <a:p>
+            <a:endParaRPr lang="de-DE"/>
+          </a:p>
+        </p:txBody>
+      </p:sp>
+      <p:sp>
+        <p:nvSpPr>
+          <p:cNvPr id="4" name="Foliennummernplatzhalter 3"/>
+          <p:cNvSpPr>
+            <a:spLocks noGrp="1"/>
+          </p:cNvSpPr>
+          <p:nvPr>
+            <p:ph type="sldNum" sz="quarter" idx="10"/>
+          </p:nvPr>
+        </p:nvSpPr>
+        <p:spPr/>
+        <p:txBody>
+          <a:bodyPr/>
+          <a:lstStyle/>
+          <a:p>
+            <a:fld id="{C7C1E745-E753-4EB9-8485-6560CD204B37}" type="slidenum">
+              <a:rPr lang="de-DE" smtClean="0"/>
+              <a:pPr/>
+              <a:t>3</a:t>
+            </a:fld>
+            <a:endParaRPr lang="de-DE" dirty="0"/>
+          </a:p>
+        </p:txBody>
+      </p:sp>
+    </p:spTree>
+    <p:extLst>
+      <p:ext uri="{BB962C8B-B14F-4D97-AF65-F5344CB8AC3E}">
+        <p14:creationId xmlns:p14="http://schemas.microsoft.com/office/powerpoint/2010/main" val="237057155"/>
+      </p:ext>
+    </p:extLst>
+  </p:cSld>
+  <p:clrMapOvr>
+    <a:masterClrMapping/>
+  </p:clrMapOvr>
+</p:notes>
+</file>
+
 <file path=ppt/slideLayouts/slideLayout1.xml><?xml version="1.0" encoding="utf-8"?>
 <p:sldLayout xmlns:a="http://schemas.openxmlformats.org/drawingml/2006/main" xmlns:r="http://schemas.openxmlformats.org/officeDocument/2006/relationships" xmlns:p="http://schemas.openxmlformats.org/presentationml/2006/main" preserve="1" userDrawn="1">
   <p:cSld name="Titelfolie">
@@ -1037,7 +1122,7 @@
         </p:nvSpPr>
         <p:spPr>
           <a:xfrm>
-            <a:off x="3071842" y="2132856"/>
+            <a:off x="3071813" y="1797840"/>
             <a:ext cx="5892646" cy="500066"/>
           </a:xfrm>
           <a:prstGeom prst="rect">
@@ -1076,7 +1161,7 @@
         </p:nvSpPr>
         <p:spPr>
           <a:xfrm>
-            <a:off x="3071802" y="2632922"/>
+            <a:off x="3071773" y="2297906"/>
             <a:ext cx="5892686" cy="500066"/>
           </a:xfrm>
           <a:prstGeom prst="rect">
@@ -1114,8 +1199,8 @@
         </p:nvSpPr>
         <p:spPr>
           <a:xfrm>
-            <a:off x="3071813" y="3398838"/>
-            <a:ext cx="6072187" cy="1508105"/>
+            <a:off x="3068173" y="2933442"/>
+            <a:ext cx="6072187" cy="1692771"/>
           </a:xfrm>
           <a:prstGeom prst="rect">
             <a:avLst/>
@@ -1138,35 +1223,70 @@
               <a:defRPr/>
             </a:pPr>
             <a:r>
-              <a:rPr lang="de-DE" dirty="0" smtClean="0">
+              <a:rPr lang="de-DE" sz="1400" dirty="0" smtClean="0">
                 <a:latin typeface="+mn-lt"/>
               </a:rPr>
-              <a:t>Patricia Böhm</a:t>
-            </a:r>
-            <a:r>
-              <a:rPr lang="de-DE" dirty="0">
+              <a:t>Matthias Bräuer</a:t>
+            </a:r>
+          </a:p>
+          <a:p>
+            <a:pPr fontAlgn="auto">
+              <a:spcBef>
+                <a:spcPts val="0"/>
+              </a:spcBef>
+              <a:spcAft>
+                <a:spcPts val="600"/>
+              </a:spcAft>
+              <a:defRPr/>
+            </a:pPr>
+            <a:r>
+              <a:rPr lang="de-DE" sz="1400" dirty="0" smtClean="0">
                 <a:latin typeface="+mn-lt"/>
               </a:rPr>
-              <a:t/>
-            </a:r>
-            <a:br>
-              <a:rPr lang="de-DE" dirty="0">
+              <a:t>Betreuer: Markus </a:t>
+            </a:r>
+            <a:r>
+              <a:rPr lang="de-DE" sz="1400" dirty="0" err="1" smtClean="0">
                 <a:latin typeface="+mn-lt"/>
               </a:rPr>
-            </a:br>
-            <a:r>
-              <a:rPr lang="de-DE" dirty="0" smtClean="0">
+              <a:t>Kattenbeck</a:t>
+            </a:r>
+            <a:r>
+              <a:rPr lang="de-DE" sz="1400" dirty="0" smtClean="0">
+                <a:latin typeface="+mn-lt"/>
+              </a:rPr>
+              <a:t> M.A.</a:t>
+            </a:r>
+          </a:p>
+          <a:p>
+            <a:pPr fontAlgn="auto">
+              <a:spcBef>
+                <a:spcPts val="0"/>
+              </a:spcBef>
+              <a:spcAft>
+                <a:spcPts val="600"/>
+              </a:spcAft>
+              <a:defRPr/>
+            </a:pPr>
+            <a:r>
+              <a:rPr lang="de-DE" sz="1400" dirty="0" smtClean="0">
                 <a:latin typeface="+mn-lt"/>
               </a:rPr>
               <a:t>Lehrstuhl</a:t>
             </a:r>
             <a:r>
-              <a:rPr lang="de-DE" baseline="0" dirty="0" smtClean="0">
+              <a:rPr lang="de-DE" sz="1400" baseline="0" dirty="0" smtClean="0">
                 <a:latin typeface="+mn-lt"/>
               </a:rPr>
-              <a:t> für Medieninformatik</a:t>
-            </a:r>
-            <a:endParaRPr lang="de-DE" dirty="0">
+              <a:t> </a:t>
+            </a:r>
+            <a:r>
+              <a:rPr lang="de-DE" sz="1400" baseline="0" dirty="0" smtClean="0">
+                <a:latin typeface="+mn-lt"/>
+              </a:rPr>
+              <a:t>für Medieninformatik</a:t>
+            </a:r>
+            <a:endParaRPr lang="de-DE" sz="1400" dirty="0">
               <a:latin typeface="+mn-lt"/>
             </a:endParaRPr>
           </a:p>
@@ -1214,7 +1334,7 @@
             <a:pPr>
               <a:defRPr/>
             </a:pPr>
-            <a:endParaRPr lang="de-DE" dirty="0">
+            <a:endParaRPr lang="de-DE" sz="1400" dirty="0">
               <a:latin typeface="Verdana" pitchFamily="34" charset="0"/>
             </a:endParaRPr>
           </a:p>
@@ -1225,6 +1345,13 @@
   <p:clrMapOvr>
     <a:masterClrMapping/>
   </p:clrMapOvr>
+  <p:timing>
+    <p:tnLst>
+      <p:par>
+        <p:cTn id="1" dur="indefinite" restart="never" nodeType="tmRoot"/>
+      </p:par>
+    </p:tnLst>
+  </p:timing>
 </p:sldLayout>
 </file>
 
@@ -2866,6 +2993,13 @@
   <p:clrMapOvr>
     <a:masterClrMapping/>
   </p:clrMapOvr>
+  <p:timing>
+    <p:tnLst>
+      <p:par>
+        <p:cTn id="1" dur="indefinite" restart="never" nodeType="tmRoot"/>
+      </p:par>
+    </p:tnLst>
+  </p:timing>
 </p:sldLayout>
 </file>
 
@@ -3046,6 +3180,13 @@
   <p:clrMapOvr>
     <a:masterClrMapping/>
   </p:clrMapOvr>
+  <p:timing>
+    <p:tnLst>
+      <p:par>
+        <p:cTn id="1" dur="indefinite" restart="never" nodeType="tmRoot"/>
+      </p:par>
+    </p:tnLst>
+  </p:timing>
 </p:sldLayout>
 </file>
 
@@ -5500,8 +5641,8 @@
         </p:nvSpPr>
         <p:spPr>
           <a:xfrm>
-            <a:off x="1763739" y="2276872"/>
-            <a:ext cx="7560789" cy="500066"/>
+            <a:off x="1403648" y="1340768"/>
+            <a:ext cx="7848821" cy="500066"/>
           </a:xfrm>
         </p:spPr>
         <p:txBody>
@@ -5509,15 +5650,36 @@
           <a:lstStyle/>
           <a:p>
             <a:r>
-              <a:rPr lang="de-DE" sz="3200" b="0" dirty="0" smtClean="0">
-                <a:latin typeface="+mj-lt"/>
+              <a:rPr lang="de-DE" dirty="0" smtClean="0">
+                <a:ea typeface="Verdana" panose="020B0604030504040204" pitchFamily="34" charset="0"/>
+                <a:cs typeface="Verdana" panose="020B0604030504040204" pitchFamily="34" charset="0"/>
               </a:rPr>
-              <a:t>Recht am eigenen Bild verhandelbar?</a:t>
-            </a:r>
-          </a:p>
-          <a:p>
-            <a:endParaRPr lang="de-DE" sz="3200" b="0" dirty="0">
-              <a:latin typeface="+mj-lt"/>
+              <a:t>Recht </a:t>
+            </a:r>
+            <a:r>
+              <a:rPr lang="de-DE" dirty="0" smtClean="0">
+                <a:ea typeface="Verdana" panose="020B0604030504040204" pitchFamily="34" charset="0"/>
+                <a:cs typeface="Verdana" panose="020B0604030504040204" pitchFamily="34" charset="0"/>
+              </a:rPr>
+              <a:t>am </a:t>
+            </a:r>
+            <a:r>
+              <a:rPr lang="de-DE" dirty="0" smtClean="0">
+                <a:ea typeface="Verdana" panose="020B0604030504040204" pitchFamily="34" charset="0"/>
+                <a:cs typeface="Verdana" panose="020B0604030504040204" pitchFamily="34" charset="0"/>
+              </a:rPr>
+              <a:t>eigenen Bild verhandelbar</a:t>
+            </a:r>
+            <a:r>
+              <a:rPr lang="de-DE" dirty="0" smtClean="0">
+                <a:ea typeface="Verdana" panose="020B0604030504040204" pitchFamily="34" charset="0"/>
+                <a:cs typeface="Verdana" panose="020B0604030504040204" pitchFamily="34" charset="0"/>
+              </a:rPr>
+              <a:t>? </a:t>
+            </a:r>
+            <a:endParaRPr lang="de-DE" dirty="0">
+              <a:ea typeface="Verdana" panose="020B0604030504040204" pitchFamily="34" charset="0"/>
+              <a:cs typeface="Verdana" panose="020B0604030504040204" pitchFamily="34" charset="0"/>
             </a:endParaRPr>
           </a:p>
         </p:txBody>
@@ -5534,8 +5696,8 @@
         </p:nvSpPr>
         <p:spPr>
           <a:xfrm>
-            <a:off x="1763688" y="2776938"/>
-            <a:ext cx="7560840" cy="1876198"/>
+            <a:off x="1403648" y="1840834"/>
+            <a:ext cx="7848872" cy="576064"/>
           </a:xfrm>
         </p:spPr>
         <p:txBody>
@@ -5543,39 +5705,22 @@
           <a:lstStyle/>
           <a:p>
             <a:r>
-              <a:rPr lang="de-DE" sz="3200" dirty="0" smtClean="0">
-                <a:solidFill>
-                  <a:schemeClr val="tx1"/>
-                </a:solidFill>
-                <a:latin typeface="+mj-lt"/>
+              <a:rPr lang="de-DE" dirty="0" smtClean="0">
+                <a:ea typeface="Verdana" panose="020B0604030504040204" pitchFamily="34" charset="0"/>
+                <a:cs typeface="Verdana" panose="020B0604030504040204" pitchFamily="34" charset="0"/>
               </a:rPr>
-              <a:t>Eine Qualitative Fallstudie am Beispiel</a:t>
-            </a:r>
-          </a:p>
-          <a:p>
-            <a:r>
-              <a:rPr lang="de-DE" sz="3200" dirty="0" smtClean="0">
-                <a:solidFill>
-                  <a:schemeClr val="tx1"/>
-                </a:solidFill>
-                <a:latin typeface="+mj-lt"/>
-              </a:rPr>
-              <a:t>einer </a:t>
-            </a:r>
-            <a:r>
-              <a:rPr lang="de-DE" sz="3200" dirty="0" err="1" smtClean="0">
-                <a:solidFill>
-                  <a:schemeClr val="tx1"/>
-                </a:solidFill>
-                <a:latin typeface="+mj-lt"/>
+              <a:t>Eine Qualitative Fallstudie am Beispiel einer </a:t>
+            </a:r>
+            <a:r>
+              <a:rPr lang="de-DE" dirty="0" err="1" smtClean="0">
+                <a:ea typeface="Verdana" panose="020B0604030504040204" pitchFamily="34" charset="0"/>
+                <a:cs typeface="Verdana" panose="020B0604030504040204" pitchFamily="34" charset="0"/>
               </a:rPr>
               <a:t>Fotobox</a:t>
             </a:r>
-            <a:endParaRPr lang="de-DE" sz="3200" dirty="0">
-              <a:solidFill>
-                <a:schemeClr val="tx1"/>
-              </a:solidFill>
-              <a:latin typeface="+mj-lt"/>
+            <a:endParaRPr lang="de-DE" dirty="0">
+              <a:ea typeface="Verdana" panose="020B0604030504040204" pitchFamily="34" charset="0"/>
+              <a:cs typeface="Verdana" panose="020B0604030504040204" pitchFamily="34" charset="0"/>
             </a:endParaRPr>
           </a:p>
         </p:txBody>
@@ -5628,8 +5773,8 @@
           <a:lstStyle/>
           <a:p>
             <a:r>
-              <a:rPr lang="de-DE" dirty="0" smtClean="0"/>
-              <a:t>4</a:t>
+              <a:rPr lang="de-DE" dirty="0"/>
+              <a:t>5</a:t>
             </a:r>
             <a:r>
               <a:rPr lang="de-DE" dirty="0" smtClean="0"/>
@@ -6794,11 +6939,6 @@
               </a:rPr>
               <a:t>Erklärungstext…..</a:t>
             </a:r>
-            <a:endParaRPr lang="de-DE" sz="1200" dirty="0">
-              <a:solidFill>
-                <a:schemeClr val="tx1"/>
-              </a:solidFill>
-            </a:endParaRPr>
           </a:p>
         </p:txBody>
       </p:sp>
@@ -7041,8 +7181,16 @@
           <a:lstStyle/>
           <a:p>
             <a:r>
+              <a:rPr lang="de-DE" dirty="0"/>
+              <a:t>5</a:t>
+            </a:r>
+            <a:r>
               <a:rPr lang="de-DE" dirty="0" smtClean="0"/>
-              <a:t>4. Usability Test (</a:t>
+              <a:t>. </a:t>
+            </a:r>
+            <a:r>
+              <a:rPr lang="de-DE" dirty="0" smtClean="0"/>
+              <a:t>Usability Test (</a:t>
             </a:r>
             <a:r>
               <a:rPr lang="de-DE" dirty="0" err="1" smtClean="0"/>
@@ -7073,7 +7221,28 @@
           <a:p>
             <a:r>
               <a:rPr lang="de-DE" dirty="0" smtClean="0"/>
-              <a:t>Kritik:</a:t>
+              <a:t>Ergebnis: </a:t>
+            </a:r>
+          </a:p>
+          <a:p>
+            <a:pPr lvl="1"/>
+            <a:r>
+              <a:rPr lang="de-DE" dirty="0" smtClean="0"/>
+              <a:t>Testpersonen kamen sehr gut mit dem System zurecht </a:t>
+            </a:r>
+            <a:endParaRPr lang="de-DE" dirty="0" smtClean="0"/>
+          </a:p>
+          <a:p>
+            <a:endParaRPr lang="de-DE" dirty="0"/>
+          </a:p>
+          <a:p>
+            <a:r>
+              <a:rPr lang="de-DE" dirty="0" smtClean="0"/>
+              <a:t>Kritik</a:t>
+            </a:r>
+            <a:r>
+              <a:rPr lang="de-DE" dirty="0" smtClean="0"/>
+              <a:t>:</a:t>
             </a:r>
           </a:p>
           <a:p>
@@ -7134,8 +7303,16 @@
           <a:lstStyle/>
           <a:p>
             <a:r>
+              <a:rPr lang="de-DE" dirty="0"/>
+              <a:t>6</a:t>
+            </a:r>
+            <a:r>
               <a:rPr lang="de-DE" dirty="0" smtClean="0"/>
-              <a:t>5. Konkrete Fragestellung</a:t>
+              <a:t>. </a:t>
+            </a:r>
+            <a:r>
+              <a:rPr lang="de-DE" dirty="0" smtClean="0"/>
+              <a:t>Konkrete Fragestellung</a:t>
             </a:r>
             <a:endParaRPr lang="de-DE" dirty="0"/>
           </a:p>
@@ -7153,29 +7330,72 @@
         </p:nvSpPr>
         <p:spPr/>
         <p:txBody>
+          <a:bodyPr>
+            <a:normAutofit/>
+          </a:bodyPr>
+          <a:lstStyle/>
+          <a:p>
+            <a:r>
+              <a:rPr lang="de-DE" sz="2400" dirty="0" smtClean="0"/>
+              <a:t>Gibt es ein allgemeines Bewusstsein für das Recht am eigenen Bild?</a:t>
+            </a:r>
+          </a:p>
+          <a:p>
+            <a:pPr lvl="1"/>
+            <a:r>
+              <a:rPr lang="de-DE" sz="2000" dirty="0" smtClean="0"/>
+              <a:t>Wenn ja, wie äußert sich dieses?</a:t>
+            </a:r>
+          </a:p>
+          <a:p>
+            <a:pPr lvl="1"/>
+            <a:r>
+              <a:rPr lang="de-DE" sz="2000" dirty="0" smtClean="0"/>
+              <a:t>Wenn nein, warum nicht?</a:t>
+            </a:r>
+            <a:endParaRPr lang="de-DE" sz="2000" dirty="0"/>
+          </a:p>
+          <a:p>
+            <a:endParaRPr lang="de-DE" dirty="0"/>
+          </a:p>
+          <a:p>
+            <a:r>
+              <a:rPr lang="de-DE" dirty="0" smtClean="0"/>
+              <a:t>Wissenschaftlicher Hintergrund</a:t>
+            </a:r>
+          </a:p>
+          <a:p>
+            <a:pPr lvl="1"/>
+            <a:r>
+              <a:rPr lang="de-DE" dirty="0" smtClean="0"/>
+              <a:t>Informationelle Selbstbestimmung</a:t>
+            </a:r>
+          </a:p>
+          <a:p>
+            <a:pPr lvl="1"/>
+            <a:r>
+              <a:rPr lang="de-DE" dirty="0" smtClean="0"/>
+              <a:t>Informationsethik</a:t>
+            </a:r>
+          </a:p>
+        </p:txBody>
+      </p:sp>
+      <p:sp>
+        <p:nvSpPr>
+          <p:cNvPr id="4" name="Textplatzhalter 3"/>
+          <p:cNvSpPr>
+            <a:spLocks noGrp="1"/>
+          </p:cNvSpPr>
+          <p:nvPr>
+            <p:ph type="body" sz="quarter" idx="10"/>
+          </p:nvPr>
+        </p:nvSpPr>
+        <p:spPr/>
+        <p:txBody>
           <a:bodyPr/>
           <a:lstStyle/>
           <a:p>
             <a:endParaRPr lang="de-DE" dirty="0"/>
-          </a:p>
-        </p:txBody>
-      </p:sp>
-      <p:sp>
-        <p:nvSpPr>
-          <p:cNvPr id="4" name="Textplatzhalter 3"/>
-          <p:cNvSpPr>
-            <a:spLocks noGrp="1"/>
-          </p:cNvSpPr>
-          <p:nvPr>
-            <p:ph type="body" sz="quarter" idx="10"/>
-          </p:nvPr>
-        </p:nvSpPr>
-        <p:spPr/>
-        <p:txBody>
-          <a:bodyPr/>
-          <a:lstStyle/>
-          <a:p>
-            <a:endParaRPr lang="de-DE"/>
           </a:p>
         </p:txBody>
       </p:sp>
@@ -7232,8 +7452,16 @@
           <a:lstStyle/>
           <a:p>
             <a:r>
+              <a:rPr lang="de-DE" dirty="0"/>
+              <a:t>7</a:t>
+            </a:r>
+            <a:r>
               <a:rPr lang="de-DE" dirty="0" smtClean="0"/>
-              <a:t>6. </a:t>
+              <a:t>. </a:t>
+            </a:r>
+            <a:r>
+              <a:rPr lang="de-DE" dirty="0" smtClean="0"/>
+              <a:t>Vorgehen</a:t>
             </a:r>
             <a:endParaRPr lang="de-DE" dirty="0"/>
           </a:p>
@@ -7255,15 +7483,55 @@
           <a:lstStyle/>
           <a:p>
             <a:r>
-              <a:rPr lang="de-DE" dirty="0" smtClean="0"/>
-              <a:t>Kombination aus teilnehmender Beobachtung und Interview (Dialog)</a:t>
-            </a:r>
-          </a:p>
-          <a:p>
-            <a:r>
-              <a:rPr lang="de-DE" dirty="0" smtClean="0"/>
+              <a:rPr lang="de-DE" sz="2000" dirty="0" smtClean="0"/>
+              <a:t>Kombination aus teilnehmender Beobachtung und </a:t>
+            </a:r>
+            <a:r>
+              <a:rPr lang="de-DE" sz="2000" dirty="0" smtClean="0"/>
+              <a:t>Interview</a:t>
+            </a:r>
+            <a:endParaRPr lang="de-DE" sz="2000" dirty="0" smtClean="0"/>
+          </a:p>
+          <a:p>
+            <a:endParaRPr lang="de-DE" sz="2000" dirty="0" smtClean="0"/>
+          </a:p>
+          <a:p>
+            <a:r>
+              <a:rPr lang="de-DE" sz="2000" dirty="0" smtClean="0"/>
               <a:t>Warum?</a:t>
             </a:r>
+          </a:p>
+          <a:p>
+            <a:endParaRPr lang="de-DE" sz="2000" dirty="0" smtClean="0"/>
+          </a:p>
+          <a:p>
+            <a:endParaRPr lang="de-DE" sz="2000" dirty="0"/>
+          </a:p>
+          <a:p>
+            <a:r>
+              <a:rPr lang="de-DE" sz="2000" dirty="0" smtClean="0"/>
+              <a:t>Quantitativer Ansatz kann Handeln und dess</a:t>
+            </a:r>
+            <a:r>
+              <a:rPr lang="de-DE" sz="2000" dirty="0" smtClean="0"/>
+              <a:t>en Gründe nicht erfassen</a:t>
+            </a:r>
+          </a:p>
+          <a:p>
+            <a:r>
+              <a:rPr lang="de-DE" sz="2000" dirty="0" smtClean="0"/>
+              <a:t>Interview bietet Möglichkeit gezielt auf Befragten einzugehen </a:t>
+            </a:r>
+          </a:p>
+          <a:p>
+            <a:r>
+              <a:rPr lang="de-DE" sz="2000" dirty="0" smtClean="0"/>
+              <a:t>Interview bietet Möglichkeit tiefgründige Antworten zu bekommen </a:t>
+            </a:r>
+            <a:endParaRPr lang="de-DE" sz="2000" dirty="0" smtClean="0"/>
+          </a:p>
+          <a:p>
+            <a:endParaRPr lang="de-DE" sz="2000" dirty="0" smtClean="0"/>
           </a:p>
           <a:p>
             <a:endParaRPr lang="de-DE" dirty="0"/>
@@ -7342,8 +7610,20 @@
           <a:lstStyle/>
           <a:p>
             <a:r>
+              <a:rPr lang="de-DE" dirty="0"/>
+              <a:t>8</a:t>
+            </a:r>
+            <a:r>
               <a:rPr lang="de-DE" dirty="0" smtClean="0"/>
-              <a:t>Quellen</a:t>
+              <a:t>. </a:t>
+            </a:r>
+            <a:r>
+              <a:rPr lang="de-DE" dirty="0" err="1" smtClean="0"/>
+              <a:t>Related</a:t>
+            </a:r>
+            <a:r>
+              <a:rPr lang="de-DE" dirty="0" smtClean="0"/>
+              <a:t> Work</a:t>
             </a:r>
             <a:endParaRPr lang="de-DE" dirty="0"/>
           </a:p>
@@ -7361,122 +7641,82 @@
         </p:nvSpPr>
         <p:spPr/>
         <p:txBody>
-          <a:bodyPr>
-            <a:normAutofit fontScale="55000" lnSpcReduction="20000"/>
-          </a:bodyPr>
-          <a:lstStyle/>
-          <a:p>
-            <a:r>
-              <a:rPr lang="en-US" dirty="0" smtClean="0"/>
-              <a:t>American Psychological Association. (2010). </a:t>
-            </a:r>
-            <a:r>
-              <a:rPr lang="en-US" i="1" dirty="0" smtClean="0"/>
-              <a:t>Concise Rules of APA Style</a:t>
-            </a:r>
-            <a:r>
-              <a:rPr lang="en-US" dirty="0" smtClean="0"/>
-              <a:t> (6th ed.). Washington: United Book Press.</a:t>
-            </a:r>
-          </a:p>
-          <a:p>
-            <a:endParaRPr lang="en-US" dirty="0" smtClean="0"/>
-          </a:p>
-          <a:p>
-            <a:r>
-              <a:rPr lang="en-US" dirty="0" smtClean="0"/>
-              <a:t>American Psychological Association. (2013). APA Style Blog. Retrieved from &lt;</a:t>
-            </a:r>
-            <a:r>
-              <a:rPr lang="en-US" dirty="0" smtClean="0">
-                <a:hlinkClick r:id="rId2"/>
-              </a:rPr>
-              <a:t>http://blog.apastyle.org/apastyle/</a:t>
-            </a:r>
-            <a:r>
-              <a:rPr lang="en-US" dirty="0" smtClean="0"/>
-              <a:t>&gt;</a:t>
-            </a:r>
-          </a:p>
-          <a:p>
-            <a:endParaRPr lang="de-DE" dirty="0" smtClean="0"/>
-          </a:p>
-          <a:p>
-            <a:endParaRPr lang="de-DE" dirty="0" smtClean="0"/>
-          </a:p>
-          <a:p>
+          <a:bodyPr/>
+          <a:lstStyle/>
+          <a:p>
+            <a:r>
+              <a:rPr lang="en-US" dirty="0" err="1"/>
+              <a:t>Kuhlen</a:t>
+            </a:r>
+            <a:r>
+              <a:rPr lang="en-US" dirty="0"/>
+              <a:t>, Rainer. (2004). </a:t>
+            </a:r>
+            <a:r>
+              <a:rPr lang="en-US" i="1" dirty="0" err="1"/>
+              <a:t>Informationsethik</a:t>
+            </a:r>
+            <a:r>
+              <a:rPr lang="en-US" dirty="0"/>
+              <a:t>. Konstanz: UVK-</a:t>
+            </a:r>
+            <a:r>
+              <a:rPr lang="en-US" dirty="0" err="1"/>
+              <a:t>Verl</a:t>
+            </a:r>
+            <a:r>
+              <a:rPr lang="en-US" dirty="0"/>
+              <a:t>.-</a:t>
+            </a:r>
+            <a:r>
+              <a:rPr lang="en-US" dirty="0" err="1"/>
+              <a:t>Ges</a:t>
+            </a:r>
+            <a:r>
+              <a:rPr lang="en-US" dirty="0"/>
+              <a:t> </a:t>
+            </a:r>
+          </a:p>
+          <a:p>
+            <a:r>
+              <a:rPr lang="de-DE" dirty="0" err="1" smtClean="0"/>
+              <a:t>Capurro</a:t>
+            </a:r>
             <a:r>
               <a:rPr lang="de-DE" dirty="0" smtClean="0"/>
-              <a:t>Balzert, H., Schröder, M., &amp; Schäfer, C. (2011). </a:t>
+              <a:t>, Rafael. (2003). </a:t>
             </a:r>
             <a:r>
               <a:rPr lang="de-DE" i="1" dirty="0" smtClean="0"/>
-              <a:t>Wissenschaftliches Arbeiten: Ethik, Inhalt &amp; Form wiss. Arbeiten, Handwerkszeug, Quellen, Projektmanagement, Präsentation (</a:t>
+              <a:t>Ethik im Netz</a:t>
             </a:r>
             <a:r>
               <a:rPr lang="de-DE" dirty="0" smtClean="0"/>
-              <a:t>2. Aufl.). Herdecke, Witten: W3L-Verlag. </a:t>
-            </a:r>
-          </a:p>
-          <a:p>
-            <a:endParaRPr lang="de-DE" dirty="0" smtClean="0"/>
+              <a:t>. Stuttgart: Steiner</a:t>
+            </a:r>
           </a:p>
           <a:p>
             <a:r>
               <a:rPr lang="de-DE" dirty="0" smtClean="0"/>
-              <a:t>Krings, Hans P. / Holz, Peter / Siekmeyer, Anne (2011): Der Bremer Schreibcoach. &lt;</a:t>
-            </a:r>
-            <a:r>
-              <a:rPr lang="de-DE" dirty="0" smtClean="0">
-                <a:hlinkClick r:id="rId3"/>
-              </a:rPr>
-              <a:t>www.bremer-schreibcoach.uni-bremen.de</a:t>
+              <a:t>Irrgang, Bernhard. (2011). </a:t>
+            </a:r>
+            <a:r>
+              <a:rPr lang="de-DE" i="1" dirty="0" smtClean="0"/>
+              <a:t>Internetethik</a:t>
             </a:r>
             <a:r>
               <a:rPr lang="de-DE" dirty="0" smtClean="0"/>
-              <a:t>&gt;.</a:t>
-            </a:r>
-          </a:p>
-          <a:p>
-            <a:endParaRPr lang="de-DE" dirty="0" smtClean="0"/>
-          </a:p>
-          <a:p>
+              <a:t>. Würzburg: Königshausen &amp; Neumann</a:t>
+            </a:r>
+          </a:p>
+          <a:p>
+            <a:r>
+              <a:rPr lang="de-DE" dirty="0" err="1" smtClean="0"/>
+              <a:t>Funiok</a:t>
+            </a:r>
             <a:r>
               <a:rPr lang="de-DE" dirty="0" smtClean="0"/>
-              <a:t>Esselborn- Krumbiegel (2012). </a:t>
-            </a:r>
-            <a:r>
-              <a:rPr lang="de-DE" i="1" dirty="0" smtClean="0"/>
-              <a:t>Richtig wissenschaftlich schreiben.</a:t>
-            </a:r>
-            <a:r>
-              <a:rPr lang="de-DE" dirty="0" smtClean="0"/>
-              <a:t> Paderborn: Ferdinand Schönigh.</a:t>
-            </a:r>
-          </a:p>
-          <a:p>
-            <a:endParaRPr lang="de-DE" dirty="0" smtClean="0"/>
-          </a:p>
-          <a:p>
-            <a:r>
-              <a:rPr lang="de-DE" dirty="0" smtClean="0"/>
-              <a:t>Karmasin, M. &amp; Rigib, R. (2010). </a:t>
-            </a:r>
-            <a:r>
-              <a:rPr lang="de-DE" i="1" dirty="0" smtClean="0"/>
-              <a:t>Die Gestaltung wissenschaftlicher </a:t>
-            </a:r>
-            <a:r>
-              <a:rPr lang="de-DE" i="1" dirty="0" err="1" smtClean="0"/>
-              <a:t>Arbeitenein</a:t>
-            </a:r>
-            <a:r>
-              <a:rPr lang="de-DE" i="1" dirty="0" smtClean="0"/>
-              <a:t> Leitfaden für Seminararbeiten, Bachelor-, Master- und Magisterarbeiten, sowie Dissertationen</a:t>
-            </a:r>
-            <a:r>
-              <a:rPr lang="de-DE" dirty="0" smtClean="0"/>
-              <a:t>. Wien: Facultas.</a:t>
+              <a:t>, Rüdiger. (2007). Handbuch Medienethik. Stuttgart: Kohlhammer</a:t>
             </a:r>
           </a:p>
           <a:p>
@@ -7484,7 +7724,31 @@
           </a:p>
         </p:txBody>
       </p:sp>
+      <p:sp>
+        <p:nvSpPr>
+          <p:cNvPr id="4" name="Textplatzhalter 3"/>
+          <p:cNvSpPr>
+            <a:spLocks noGrp="1"/>
+          </p:cNvSpPr>
+          <p:nvPr>
+            <p:ph type="body" sz="quarter" idx="10"/>
+          </p:nvPr>
+        </p:nvSpPr>
+        <p:spPr/>
+        <p:txBody>
+          <a:bodyPr/>
+          <a:lstStyle/>
+          <a:p>
+            <a:endParaRPr lang="de-DE"/>
+          </a:p>
+        </p:txBody>
+      </p:sp>
     </p:spTree>
+    <p:extLst>
+      <p:ext uri="{BB962C8B-B14F-4D97-AF65-F5344CB8AC3E}">
+        <p14:creationId xmlns:p14="http://schemas.microsoft.com/office/powerpoint/2010/main" val="307042253"/>
+      </p:ext>
+    </p:extLst>
   </p:cSld>
   <p:clrMapOvr>
     <a:masterClrMapping/>
@@ -7556,8 +7820,94 @@
           </a:xfrm>
         </p:spPr>
         <p:txBody>
-          <a:bodyPr/>
-          <a:lstStyle/>
+          <a:bodyPr>
+            <a:normAutofit/>
+          </a:bodyPr>
+          <a:lstStyle/>
+          <a:p>
+            <a:pPr marL="0" indent="0">
+              <a:buNone/>
+            </a:pPr>
+            <a:r>
+              <a:rPr lang="de-DE" dirty="0"/>
+              <a:t>1. Bisherige Ergebnisse</a:t>
+            </a:r>
+          </a:p>
+          <a:p>
+            <a:pPr marL="0" indent="0">
+              <a:buNone/>
+            </a:pPr>
+            <a:r>
+              <a:rPr lang="de-DE" dirty="0"/>
+              <a:t>2. Technische Umsetzung</a:t>
+            </a:r>
+          </a:p>
+          <a:p>
+            <a:pPr marL="0" indent="0">
+              <a:buNone/>
+            </a:pPr>
+            <a:r>
+              <a:rPr lang="de-DE" dirty="0"/>
+              <a:t>3. Technische Probleme</a:t>
+            </a:r>
+          </a:p>
+          <a:p>
+            <a:pPr marL="0" indent="0">
+              <a:buNone/>
+            </a:pPr>
+            <a:r>
+              <a:rPr lang="de-DE" dirty="0"/>
+              <a:t>4. Technische Lösungen</a:t>
+            </a:r>
+          </a:p>
+          <a:p>
+            <a:pPr marL="0" indent="0">
+              <a:buNone/>
+            </a:pPr>
+            <a:r>
+              <a:rPr lang="de-DE" dirty="0"/>
+              <a:t>5. Usability Test</a:t>
+            </a:r>
+          </a:p>
+          <a:p>
+            <a:pPr marL="0" indent="0">
+              <a:buNone/>
+            </a:pPr>
+            <a:r>
+              <a:rPr lang="de-DE" dirty="0" smtClean="0"/>
+              <a:t>6</a:t>
+            </a:r>
+            <a:r>
+              <a:rPr lang="de-DE" dirty="0"/>
+              <a:t>. Konkrete Fragestellung</a:t>
+            </a:r>
+          </a:p>
+          <a:p>
+            <a:pPr marL="0" indent="0">
+              <a:buNone/>
+            </a:pPr>
+            <a:r>
+              <a:rPr lang="de-DE" dirty="0"/>
+              <a:t>7. Vorgehen</a:t>
+            </a:r>
+          </a:p>
+          <a:p>
+            <a:pPr marL="0" indent="0">
+              <a:buNone/>
+            </a:pPr>
+            <a:r>
+              <a:rPr lang="de-DE" dirty="0"/>
+              <a:t>8. </a:t>
+            </a:r>
+            <a:r>
+              <a:rPr lang="de-DE" dirty="0" err="1"/>
+              <a:t>Related</a:t>
+            </a:r>
+            <a:r>
+              <a:rPr lang="de-DE" dirty="0"/>
+              <a:t> Work</a:t>
+            </a:r>
+          </a:p>
           <a:p>
             <a:endParaRPr lang="de-DE" dirty="0"/>
           </a:p>
@@ -7635,7 +7985,28 @@
           </a:bodyPr>
           <a:lstStyle/>
           <a:p>
+            <a:r>
+              <a:rPr lang="de-DE" dirty="0" smtClean="0"/>
+              <a:t>Grobhandtaster in den ein Funksender verbaut wurde</a:t>
+            </a:r>
+          </a:p>
+          <a:p>
             <a:endParaRPr lang="de-DE" dirty="0"/>
+          </a:p>
+          <a:p>
+            <a:r>
+              <a:rPr lang="de-DE" dirty="0" smtClean="0"/>
+              <a:t>Fertiges Fotoboxgehäuse mit Aussparungen für Kamera, Tablet + Steckdosen für Stromversorgung</a:t>
+            </a:r>
+          </a:p>
+          <a:p>
+            <a:endParaRPr lang="de-DE" dirty="0"/>
+          </a:p>
+          <a:p>
+            <a:r>
+              <a:rPr lang="de-DE" dirty="0" smtClean="0"/>
+              <a:t>Lauffähige Android App + PHP-Server</a:t>
+            </a:r>
           </a:p>
         </p:txBody>
       </p:sp>
@@ -7687,8 +8058,16 @@
           <a:lstStyle/>
           <a:p>
             <a:r>
+              <a:rPr lang="de-DE" dirty="0"/>
+              <a:t>2</a:t>
+            </a:r>
+            <a:r>
               <a:rPr lang="de-DE" dirty="0" smtClean="0"/>
-              <a:t>1. Technische Umsetzung</a:t>
+              <a:t>. </a:t>
+            </a:r>
+            <a:r>
+              <a:rPr lang="de-DE" dirty="0" smtClean="0"/>
+              <a:t>Technische Umsetzung</a:t>
             </a:r>
             <a:endParaRPr lang="de-DE" dirty="0"/>
           </a:p>
@@ -8458,8 +8837,16 @@
           <a:lstStyle/>
           <a:p>
             <a:r>
+              <a:rPr lang="de-DE" dirty="0"/>
+              <a:t>3</a:t>
+            </a:r>
+            <a:r>
               <a:rPr lang="de-DE" dirty="0" smtClean="0"/>
-              <a:t>2. Technische Probleme</a:t>
+              <a:t>. </a:t>
+            </a:r>
+            <a:r>
+              <a:rPr lang="de-DE" dirty="0" smtClean="0"/>
+              <a:t>Technische Probleme</a:t>
             </a:r>
             <a:endParaRPr lang="de-DE" dirty="0"/>
           </a:p>
@@ -8486,15 +8873,29 @@
             </a:r>
           </a:p>
           <a:p>
+            <a:endParaRPr lang="de-DE" sz="2000" dirty="0" smtClean="0"/>
+          </a:p>
+          <a:p>
             <a:r>
               <a:rPr lang="de-DE" sz="2000" dirty="0" smtClean="0"/>
-              <a:t>Canon EOS 600D schaltet im Live View in den „Silent Mode“ um -&gt; Auslösen eines externen Blitzes nicht möglich</a:t>
-            </a:r>
-          </a:p>
-          <a:p>
+              <a:t>Canon </a:t>
+            </a:r>
             <a:r>
               <a:rPr lang="de-DE" sz="2000" dirty="0" smtClean="0"/>
-              <a:t>Bildqualität sehr schlecht (Live Mode Qualität)</a:t>
+              <a:t>EOS 600D schaltet im Live View in den „Silent Mode“ um -&gt; Auslösen eines externen Blitzes nicht möglich</a:t>
+            </a:r>
+          </a:p>
+          <a:p>
+            <a:endParaRPr lang="de-DE" sz="2000" dirty="0" smtClean="0"/>
+          </a:p>
+          <a:p>
+            <a:r>
+              <a:rPr lang="de-DE" sz="2000" dirty="0" smtClean="0"/>
+              <a:t>Bildqualität </a:t>
+            </a:r>
+            <a:r>
+              <a:rPr lang="de-DE" sz="2000" dirty="0" smtClean="0"/>
+              <a:t>sehr schlecht (Live Mode Qualität)</a:t>
             </a:r>
             <a:endParaRPr lang="de-DE" sz="2000" dirty="0"/>
           </a:p>
@@ -8572,8 +8973,16 @@
           <a:lstStyle/>
           <a:p>
             <a:r>
+              <a:rPr lang="de-DE" dirty="0"/>
+              <a:t>4</a:t>
+            </a:r>
+            <a:r>
               <a:rPr lang="de-DE" dirty="0" smtClean="0"/>
-              <a:t>3. Technische Lösungen</a:t>
+              <a:t>. </a:t>
+            </a:r>
+            <a:r>
+              <a:rPr lang="de-DE" dirty="0" smtClean="0"/>
+              <a:t>Technische Lösungen</a:t>
             </a:r>
             <a:endParaRPr lang="de-DE" dirty="0"/>
           </a:p>
@@ -8706,8 +9115,8 @@
           <a:lstStyle/>
           <a:p>
             <a:r>
-              <a:rPr lang="de-DE" dirty="0" smtClean="0"/>
-              <a:t>4</a:t>
+              <a:rPr lang="de-DE" dirty="0"/>
+              <a:t>5</a:t>
             </a:r>
             <a:r>
               <a:rPr lang="de-DE" dirty="0" smtClean="0"/>
@@ -8739,15 +9148,65 @@
           <a:lstStyle/>
           <a:p>
             <a:r>
+              <a:rPr lang="de-DE" sz="2400" dirty="0" smtClean="0"/>
+              <a:t>Bestehendes Userinterface wird auf </a:t>
+            </a:r>
+            <a:r>
+              <a:rPr lang="de-DE" sz="2400" dirty="0" err="1" smtClean="0"/>
+              <a:t>Intuitivität</a:t>
+            </a:r>
+            <a:r>
+              <a:rPr lang="de-DE" sz="2400" dirty="0"/>
+              <a:t> </a:t>
+            </a:r>
+            <a:r>
+              <a:rPr lang="de-DE" sz="2400" dirty="0" smtClean="0"/>
+              <a:t>getestet</a:t>
+            </a:r>
+            <a:endParaRPr lang="de-DE" sz="2400" dirty="0" smtClean="0"/>
+          </a:p>
+          <a:p>
+            <a:endParaRPr lang="de-DE" sz="2400" dirty="0" smtClean="0"/>
+          </a:p>
+          <a:p>
+            <a:r>
+              <a:rPr lang="de-DE" sz="2400" dirty="0" smtClean="0"/>
+              <a:t>Iterativer Ansatz:</a:t>
+            </a:r>
+          </a:p>
+          <a:p>
+            <a:pPr lvl="1"/>
+            <a:r>
+              <a:rPr lang="de-DE" sz="2000" dirty="0" smtClean="0"/>
+              <a:t>2 Testläufe mit je 3 Personen mit anschließendem </a:t>
+            </a:r>
+            <a:r>
+              <a:rPr lang="de-DE" sz="2000" dirty="0" err="1" smtClean="0"/>
+              <a:t>Redesign</a:t>
+            </a:r>
+            <a:endParaRPr lang="de-DE" sz="2000" dirty="0"/>
+          </a:p>
+          <a:p>
+            <a:pPr lvl="1"/>
+            <a:r>
+              <a:rPr lang="de-DE" sz="2000" dirty="0" smtClean="0"/>
+              <a:t>Test besteht aus 5 Tasks:</a:t>
+            </a:r>
+          </a:p>
+          <a:p>
+            <a:pPr lvl="2"/>
+            <a:r>
               <a:rPr lang="de-DE" dirty="0" smtClean="0"/>
-              <a:t>2 * 3 Testpersonen</a:t>
-            </a:r>
-          </a:p>
-          <a:p>
+              <a:t>Erster Task zielt auf allgemeine Verständlichkeit des UIs ab</a:t>
+            </a:r>
+          </a:p>
+          <a:p>
+            <a:pPr lvl="2"/>
             <a:r>
               <a:rPr lang="de-DE" dirty="0" smtClean="0"/>
-              <a:t>5 verschiedene Tasks</a:t>
-            </a:r>
+              <a:t>Weitere Tasks zielen auf einzelne Features der App ab</a:t>
+            </a:r>
+            <a:endParaRPr lang="de-DE" dirty="0" smtClean="0"/>
           </a:p>
           <a:p>
             <a:endParaRPr lang="de-DE" dirty="0"/>
@@ -8802,8 +9261,8 @@
           <a:lstStyle/>
           <a:p>
             <a:r>
-              <a:rPr lang="de-DE" dirty="0" smtClean="0"/>
-              <a:t>4</a:t>
+              <a:rPr lang="de-DE" dirty="0"/>
+              <a:t>5</a:t>
             </a:r>
             <a:r>
               <a:rPr lang="de-DE" dirty="0" smtClean="0"/>
@@ -9909,8 +10368,8 @@
           <a:lstStyle/>
           <a:p>
             <a:r>
-              <a:rPr lang="de-DE" dirty="0" smtClean="0"/>
-              <a:t>4</a:t>
+              <a:rPr lang="de-DE" dirty="0"/>
+              <a:t>5</a:t>
             </a:r>
             <a:r>
               <a:rPr lang="de-DE" dirty="0" smtClean="0"/>
@@ -9959,12 +10418,12 @@
               <a:t>(</a:t>
             </a:r>
             <a:r>
-              <a:rPr lang="de-DE" sz="1600" dirty="0" err="1"/>
-              <a:t>z.B</a:t>
+              <a:rPr lang="de-DE" sz="1600" dirty="0" smtClean="0"/>
+              <a:t>z.B. </a:t>
             </a:r>
             <a:r>
               <a:rPr lang="de-DE" sz="1600" dirty="0"/>
-              <a:t> „Email ändern</a:t>
+              <a:t>„Email ändern</a:t>
             </a:r>
             <a:r>
               <a:rPr lang="de-DE" sz="1600" dirty="0" smtClean="0"/>
@@ -10011,12 +10470,12 @@
               <a:t>Umbenennung von </a:t>
             </a:r>
             <a:r>
-              <a:rPr lang="de-DE" sz="1600" dirty="0" err="1" smtClean="0"/>
-              <a:t>z.B</a:t>
-            </a:r>
-            <a:r>
               <a:rPr lang="de-DE" sz="1600" dirty="0" smtClean="0"/>
-              <a:t> „Hochladen“ zu „Senden“ </a:t>
+              <a:t>z.B. </a:t>
+            </a:r>
+            <a:r>
+              <a:rPr lang="de-DE" sz="1600" dirty="0" smtClean="0"/>
+              <a:t>„Hochladen“ zu „Senden“ </a:t>
             </a:r>
             <a:endParaRPr lang="de-DE" sz="1600" dirty="0"/>
           </a:p>

</xml_diff>